<commit_message>
Updated presentation again :p
</commit_message>
<xml_diff>
--- a/Webapp_java.pptx
+++ b/Webapp_java.pptx
@@ -5,7 +5,7 @@
     <p:sldMasterId id="2147483648" r:id="rId1"/>
   </p:sldMasterIdLst>
   <p:notesMasterIdLst>
-    <p:notesMasterId r:id="rId31"/>
+    <p:notesMasterId r:id="rId33"/>
   </p:notesMasterIdLst>
   <p:sldIdLst>
     <p:sldId id="256" r:id="rId2"/>
@@ -37,6 +37,8 @@
     <p:sldId id="286" r:id="rId28"/>
     <p:sldId id="285" r:id="rId29"/>
     <p:sldId id="287" r:id="rId30"/>
+    <p:sldId id="288" r:id="rId31"/>
+    <p:sldId id="289" r:id="rId32"/>
   </p:sldIdLst>
   <p:sldSz cx="12192000" cy="6858000"/>
   <p:notesSz cx="6858000" cy="9144000"/>
@@ -7370,7 +7372,7 @@
             </a:pPr>
             <a:r>
               <a:rPr lang="en-US" sz="2000"/>
-              <a:t>A HATEOAS site dynamically proved information on how to navigate its’ REST-interfaces</a:t>
+              <a:t>A HATEOAS site dynamically provides information on how to navigate its’ REST-interfaces</a:t>
             </a:r>
           </a:p>
           <a:p>
@@ -7417,178 +7419,6 @@
               <a:buNone/>
             </a:pPr>
             <a:endParaRPr lang="en-US" sz="100"/>
-          </a:p>
-          <a:p>
-            <a:pPr marL="0" indent="0">
-              <a:lnSpc>
-                <a:spcPct val="150000"/>
-              </a:lnSpc>
-              <a:buNone/>
-            </a:pPr>
-            <a:r>
-              <a:rPr lang="en-US" sz="2000"/>
-              <a:t>The response contains follow-up links. Which links are included may vary, depending on the state of the resource. </a:t>
-            </a:r>
-          </a:p>
-          <a:p>
-            <a:pPr marL="0" indent="0">
-              <a:lnSpc>
-                <a:spcPct val="150000"/>
-              </a:lnSpc>
-              <a:buNone/>
-            </a:pPr>
-            <a:r>
-              <a:rPr lang="en-US" sz="2000"/>
-              <a:t>E.g. if an account is overdrawn, maybe the only possible action is to deposit money into it.</a:t>
-            </a:r>
-          </a:p>
-        </p:txBody>
-      </p:sp>
-      <p:sp>
-        <p:nvSpPr>
-          <p:cNvPr id="5" name="TextBox 4"/>
-          <p:cNvSpPr txBox="1"/>
-          <p:nvPr/>
-        </p:nvSpPr>
-        <p:spPr>
-          <a:xfrm>
-            <a:off x="1318161" y="2696806"/>
-            <a:ext cx="4465122" cy="1169551"/>
-          </a:xfrm>
-          <a:prstGeom prst="rect">
-            <a:avLst/>
-          </a:prstGeom>
-          <a:noFill/>
-        </p:spPr>
-        <p:txBody>
-          <a:bodyPr wrap="square" rtlCol="0">
-            <a:spAutoFit/>
-          </a:bodyPr>
-          <a:lstStyle/>
-          <a:p>
-            <a:r>
-              <a:rPr lang="en-US" sz="1400"/>
-              <a:t>Normal REST response:</a:t>
-            </a:r>
-          </a:p>
-          <a:p>
-            <a:r>
-              <a:rPr lang="en-US" sz="1400"/>
-              <a:t>{</a:t>
-            </a:r>
-          </a:p>
-          <a:p>
-            <a:r>
-              <a:rPr lang="en-US" sz="1400"/>
-              <a:t>“name”: “Alex”,</a:t>
-            </a:r>
-          </a:p>
-          <a:p>
-            <a:r>
-              <a:rPr lang="en-US" sz="1400"/>
-              <a:t>“account_no”: 12345</a:t>
-            </a:r>
-          </a:p>
-          <a:p>
-            <a:r>
-              <a:rPr lang="en-US" sz="1400"/>
-              <a:t>}</a:t>
-            </a:r>
-            <a:endParaRPr lang="fr-FR" sz="1400"/>
-          </a:p>
-        </p:txBody>
-      </p:sp>
-      <p:sp>
-        <p:nvSpPr>
-          <p:cNvPr id="6" name="TextBox 5"/>
-          <p:cNvSpPr txBox="1"/>
-          <p:nvPr/>
-        </p:nvSpPr>
-        <p:spPr>
-          <a:xfrm>
-            <a:off x="4904509" y="2696806"/>
-            <a:ext cx="6650182" cy="2462213"/>
-          </a:xfrm>
-          <a:prstGeom prst="rect">
-            <a:avLst/>
-          </a:prstGeom>
-          <a:noFill/>
-        </p:spPr>
-        <p:txBody>
-          <a:bodyPr wrap="square" rtlCol="0">
-            <a:spAutoFit/>
-          </a:bodyPr>
-          <a:lstStyle/>
-          <a:p>
-            <a:r>
-              <a:rPr lang="en-US" sz="1400"/>
-              <a:t>HATEOAS type-response:</a:t>
-            </a:r>
-          </a:p>
-          <a:p>
-            <a:r>
-              <a:rPr lang="en-US" sz="1400"/>
-              <a:t>{“content”: [ {</a:t>
-            </a:r>
-          </a:p>
-          <a:p>
-            <a:r>
-              <a:rPr lang="en-US" sz="1400"/>
-              <a:t>    “name”: “Alex”, </a:t>
-            </a:r>
-          </a:p>
-          <a:p>
-            <a:r>
-              <a:rPr lang="en-US" sz="1400"/>
-              <a:t>        "links": [ {</a:t>
-            </a:r>
-          </a:p>
-          <a:p>
-            <a:r>
-              <a:rPr lang="en-US" sz="1400"/>
-              <a:t>              "rel": "self",</a:t>
-            </a:r>
-          </a:p>
-          <a:p>
-            <a:r>
-              <a:rPr lang="en-US" sz="1400"/>
-              <a:t>              "href”:"http://foo.bar/customer/1"} ]},</a:t>
-            </a:r>
-          </a:p>
-          <a:p>
-            <a:r>
-              <a:rPr lang="en-US" sz="1400"/>
-              <a:t>    {</a:t>
-            </a:r>
-          </a:p>
-          <a:p>
-            <a:r>
-              <a:rPr lang="en-US" sz="1400"/>
-              <a:t>     “account_no”: 12345,</a:t>
-            </a:r>
-          </a:p>
-          <a:p>
-            <a:r>
-              <a:rPr lang="en-US" sz="1400"/>
-              <a:t>         "links": [ {</a:t>
-            </a:r>
-          </a:p>
-          <a:p>
-            <a:r>
-              <a:rPr lang="en-US" sz="1400"/>
-              <a:t>              "rel": ”deposit",</a:t>
-            </a:r>
-          </a:p>
-          <a:p>
-            <a:r>
-              <a:rPr lang="en-US" sz="1400"/>
-              <a:t>              "href”:"http://foo.bar/account/deposit/12345"}</a:t>
-            </a:r>
-            <a:r>
-              <a:rPr lang="en-US" sz="1400"/>
-              <a:t> }]}</a:t>
-            </a:r>
-            <a:endParaRPr lang="fr-FR" sz="1400"/>
           </a:p>
         </p:txBody>
       </p:sp>
@@ -7793,6 +7623,638 @@
     <p:extLst>
       <p:ext uri="{BB962C8B-B14F-4D97-AF65-F5344CB8AC3E}">
         <p14:creationId xmlns:p14="http://schemas.microsoft.com/office/powerpoint/2010/main" val="1403040190"/>
+      </p:ext>
+    </p:extLst>
+  </p:cSld>
+  <p:clrMapOvr>
+    <a:masterClrMapping/>
+  </p:clrMapOvr>
+</p:sld>
+</file>
+
+<file path=ppt/slides/slide30.xml><?xml version="1.0" encoding="utf-8"?>
+<p:sld xmlns:a="http://schemas.openxmlformats.org/drawingml/2006/main" xmlns:r="http://schemas.openxmlformats.org/officeDocument/2006/relationships" xmlns:p="http://schemas.openxmlformats.org/presentationml/2006/main">
+  <p:cSld>
+    <p:spTree>
+      <p:nvGrpSpPr>
+        <p:cNvPr id="1" name=""/>
+        <p:cNvGrpSpPr/>
+        <p:nvPr/>
+      </p:nvGrpSpPr>
+      <p:grpSpPr>
+        <a:xfrm>
+          <a:off x="0" y="0"/>
+          <a:ext cx="0" cy="0"/>
+          <a:chOff x="0" y="0"/>
+          <a:chExt cx="0" cy="0"/>
+        </a:xfrm>
+      </p:grpSpPr>
+      <p:sp>
+        <p:nvSpPr>
+          <p:cNvPr id="2" name="Title 1"/>
+          <p:cNvSpPr>
+            <a:spLocks noGrp="1"/>
+          </p:cNvSpPr>
+          <p:nvPr>
+            <p:ph type="title"/>
+          </p:nvPr>
+        </p:nvSpPr>
+        <p:spPr/>
+        <p:txBody>
+          <a:bodyPr/>
+          <a:lstStyle/>
+          <a:p>
+            <a:r>
+              <a:rPr lang="en-US"/>
+              <a:t>HATEOAS</a:t>
+            </a:r>
+          </a:p>
+        </p:txBody>
+      </p:sp>
+      <p:sp>
+        <p:nvSpPr>
+          <p:cNvPr id="3" name="Content Placeholder 2"/>
+          <p:cNvSpPr>
+            <a:spLocks noGrp="1"/>
+          </p:cNvSpPr>
+          <p:nvPr>
+            <p:ph sz="half" idx="1"/>
+          </p:nvPr>
+        </p:nvSpPr>
+        <p:spPr>
+          <a:xfrm>
+            <a:off x="838200" y="1504256"/>
+            <a:ext cx="10515600" cy="5353743"/>
+          </a:xfrm>
+        </p:spPr>
+        <p:txBody>
+          <a:bodyPr>
+            <a:normAutofit/>
+          </a:bodyPr>
+          <a:lstStyle/>
+          <a:p>
+            <a:pPr marL="0" indent="0">
+              <a:lnSpc>
+                <a:spcPct val="150000"/>
+              </a:lnSpc>
+              <a:buNone/>
+            </a:pPr>
+            <a:r>
+              <a:rPr lang="en-US" sz="2000"/>
+              <a:t>HATEOAS (Hypermedia as the Engine of Application State) is a constraint on REST</a:t>
+            </a:r>
+          </a:p>
+          <a:p>
+            <a:pPr marL="0" indent="0">
+              <a:lnSpc>
+                <a:spcPct val="150000"/>
+              </a:lnSpc>
+              <a:buNone/>
+            </a:pPr>
+            <a:r>
+              <a:rPr lang="en-US" sz="2000"/>
+              <a:t>A HATEOAS site dynamically provides information on how to navigate its’ REST-interfaces</a:t>
+            </a:r>
+          </a:p>
+          <a:p>
+            <a:pPr marL="0" indent="0">
+              <a:lnSpc>
+                <a:spcPct val="150000"/>
+              </a:lnSpc>
+              <a:buNone/>
+            </a:pPr>
+            <a:endParaRPr lang="en-US" sz="2000"/>
+          </a:p>
+          <a:p>
+            <a:pPr marL="0" indent="0">
+              <a:lnSpc>
+                <a:spcPct val="150000"/>
+              </a:lnSpc>
+              <a:buNone/>
+            </a:pPr>
+            <a:endParaRPr lang="en-US" sz="2000"/>
+          </a:p>
+          <a:p>
+            <a:pPr marL="0" indent="0">
+              <a:lnSpc>
+                <a:spcPct val="150000"/>
+              </a:lnSpc>
+              <a:buNone/>
+            </a:pPr>
+            <a:endParaRPr lang="en-US" sz="2000"/>
+          </a:p>
+          <a:p>
+            <a:pPr marL="0" indent="0">
+              <a:lnSpc>
+                <a:spcPct val="150000"/>
+              </a:lnSpc>
+              <a:buNone/>
+            </a:pPr>
+            <a:endParaRPr lang="en-US" sz="2000"/>
+          </a:p>
+          <a:p>
+            <a:pPr marL="0" indent="0">
+              <a:lnSpc>
+                <a:spcPct val="150000"/>
+              </a:lnSpc>
+              <a:buNone/>
+            </a:pPr>
+            <a:endParaRPr lang="en-US" sz="100"/>
+          </a:p>
+          <a:p>
+            <a:pPr marL="0" indent="0">
+              <a:lnSpc>
+                <a:spcPct val="150000"/>
+              </a:lnSpc>
+              <a:buNone/>
+            </a:pPr>
+            <a:r>
+              <a:rPr lang="en-US" sz="2000"/>
+              <a:t>The response contains follow-up links. Which links are included may vary, depending on the state of the resource. </a:t>
+            </a:r>
+          </a:p>
+          <a:p>
+            <a:pPr marL="0" indent="0">
+              <a:lnSpc>
+                <a:spcPct val="150000"/>
+              </a:lnSpc>
+              <a:buNone/>
+            </a:pPr>
+            <a:r>
+              <a:rPr lang="en-US" sz="2000"/>
+              <a:t>E.g. if an account is overdrawn, maybe the only possible action is to deposit money into it.</a:t>
+            </a:r>
+          </a:p>
+        </p:txBody>
+      </p:sp>
+      <p:sp>
+        <p:nvSpPr>
+          <p:cNvPr id="5" name="TextBox 4"/>
+          <p:cNvSpPr txBox="1"/>
+          <p:nvPr/>
+        </p:nvSpPr>
+        <p:spPr>
+          <a:xfrm>
+            <a:off x="1318161" y="2696806"/>
+            <a:ext cx="4465122" cy="1169551"/>
+          </a:xfrm>
+          <a:prstGeom prst="rect">
+            <a:avLst/>
+          </a:prstGeom>
+          <a:noFill/>
+        </p:spPr>
+        <p:txBody>
+          <a:bodyPr wrap="square" rtlCol="0">
+            <a:spAutoFit/>
+          </a:bodyPr>
+          <a:lstStyle/>
+          <a:p>
+            <a:r>
+              <a:rPr lang="en-US" sz="1400"/>
+              <a:t>Normal REST response:</a:t>
+            </a:r>
+          </a:p>
+          <a:p>
+            <a:r>
+              <a:rPr lang="en-US" sz="1400"/>
+              <a:t>{</a:t>
+            </a:r>
+          </a:p>
+          <a:p>
+            <a:r>
+              <a:rPr lang="en-US" sz="1400"/>
+              <a:t>“name”: “Alex”,</a:t>
+            </a:r>
+          </a:p>
+          <a:p>
+            <a:r>
+              <a:rPr lang="en-US" sz="1400"/>
+              <a:t>“account_no”: 12345</a:t>
+            </a:r>
+          </a:p>
+          <a:p>
+            <a:r>
+              <a:rPr lang="en-US" sz="1400"/>
+              <a:t>}</a:t>
+            </a:r>
+            <a:endParaRPr lang="fr-FR" sz="1400"/>
+          </a:p>
+        </p:txBody>
+      </p:sp>
+      <p:sp>
+        <p:nvSpPr>
+          <p:cNvPr id="6" name="TextBox 5"/>
+          <p:cNvSpPr txBox="1"/>
+          <p:nvPr/>
+        </p:nvSpPr>
+        <p:spPr>
+          <a:xfrm>
+            <a:off x="4904509" y="2696806"/>
+            <a:ext cx="6650182" cy="2462213"/>
+          </a:xfrm>
+          <a:prstGeom prst="rect">
+            <a:avLst/>
+          </a:prstGeom>
+          <a:noFill/>
+        </p:spPr>
+        <p:txBody>
+          <a:bodyPr wrap="square" rtlCol="0">
+            <a:spAutoFit/>
+          </a:bodyPr>
+          <a:lstStyle/>
+          <a:p>
+            <a:r>
+              <a:rPr lang="en-US" sz="1400"/>
+              <a:t>HATEOAS type-response:</a:t>
+            </a:r>
+          </a:p>
+          <a:p>
+            <a:r>
+              <a:rPr lang="en-US" sz="1400"/>
+              <a:t>{“content”: [ {</a:t>
+            </a:r>
+          </a:p>
+          <a:p>
+            <a:r>
+              <a:rPr lang="en-US" sz="1400"/>
+              <a:t>    “name”: “Alex”, </a:t>
+            </a:r>
+          </a:p>
+          <a:p>
+            <a:r>
+              <a:rPr lang="en-US" sz="1400"/>
+              <a:t>        "links": [ {</a:t>
+            </a:r>
+          </a:p>
+          <a:p>
+            <a:r>
+              <a:rPr lang="en-US" sz="1400"/>
+              <a:t>              "rel": "self",</a:t>
+            </a:r>
+          </a:p>
+          <a:p>
+            <a:r>
+              <a:rPr lang="en-US" sz="1400"/>
+              <a:t>              "href”:"http://foo.bar/customer/1"} ]},</a:t>
+            </a:r>
+          </a:p>
+          <a:p>
+            <a:r>
+              <a:rPr lang="en-US" sz="1400"/>
+              <a:t>    {</a:t>
+            </a:r>
+          </a:p>
+          <a:p>
+            <a:r>
+              <a:rPr lang="en-US" sz="1400"/>
+              <a:t>     “account_no”: 12345,</a:t>
+            </a:r>
+          </a:p>
+          <a:p>
+            <a:r>
+              <a:rPr lang="en-US" sz="1400"/>
+              <a:t>         "links": [ {</a:t>
+            </a:r>
+          </a:p>
+          <a:p>
+            <a:r>
+              <a:rPr lang="en-US" sz="1400"/>
+              <a:t>              "rel": ”deposit",</a:t>
+            </a:r>
+          </a:p>
+          <a:p>
+            <a:r>
+              <a:rPr lang="en-US" sz="1400"/>
+              <a:t>              "href”:"http://foo.bar/account/deposit/12345"}</a:t>
+            </a:r>
+            <a:r>
+              <a:rPr lang="en-US" sz="1400"/>
+              <a:t> }]}</a:t>
+            </a:r>
+            <a:endParaRPr lang="fr-FR" sz="1400"/>
+          </a:p>
+        </p:txBody>
+      </p:sp>
+    </p:spTree>
+    <p:extLst>
+      <p:ext uri="{BB962C8B-B14F-4D97-AF65-F5344CB8AC3E}">
+        <p14:creationId xmlns:p14="http://schemas.microsoft.com/office/powerpoint/2010/main" val="240394688"/>
+      </p:ext>
+    </p:extLst>
+  </p:cSld>
+  <p:clrMapOvr>
+    <a:masterClrMapping/>
+  </p:clrMapOvr>
+</p:sld>
+</file>
+
+<file path=ppt/slides/slide31.xml><?xml version="1.0" encoding="utf-8"?>
+<p:sld xmlns:a="http://schemas.openxmlformats.org/drawingml/2006/main" xmlns:r="http://schemas.openxmlformats.org/officeDocument/2006/relationships" xmlns:p="http://schemas.openxmlformats.org/presentationml/2006/main">
+  <p:cSld>
+    <p:spTree>
+      <p:nvGrpSpPr>
+        <p:cNvPr id="1" name=""/>
+        <p:cNvGrpSpPr/>
+        <p:nvPr/>
+      </p:nvGrpSpPr>
+      <p:grpSpPr>
+        <a:xfrm>
+          <a:off x="0" y="0"/>
+          <a:ext cx="0" cy="0"/>
+          <a:chOff x="0" y="0"/>
+          <a:chExt cx="0" cy="0"/>
+        </a:xfrm>
+      </p:grpSpPr>
+      <p:sp>
+        <p:nvSpPr>
+          <p:cNvPr id="2" name="Title 1"/>
+          <p:cNvSpPr>
+            <a:spLocks noGrp="1"/>
+          </p:cNvSpPr>
+          <p:nvPr>
+            <p:ph type="title"/>
+          </p:nvPr>
+        </p:nvSpPr>
+        <p:spPr/>
+        <p:txBody>
+          <a:bodyPr/>
+          <a:lstStyle/>
+          <a:p>
+            <a:r>
+              <a:rPr lang="en-US"/>
+              <a:t>HATEOAS</a:t>
+            </a:r>
+          </a:p>
+        </p:txBody>
+      </p:sp>
+      <p:sp>
+        <p:nvSpPr>
+          <p:cNvPr id="3" name="Content Placeholder 2"/>
+          <p:cNvSpPr>
+            <a:spLocks noGrp="1"/>
+          </p:cNvSpPr>
+          <p:nvPr>
+            <p:ph sz="half" idx="1"/>
+          </p:nvPr>
+        </p:nvSpPr>
+        <p:spPr>
+          <a:xfrm>
+            <a:off x="838200" y="1504256"/>
+            <a:ext cx="10515600" cy="5353743"/>
+          </a:xfrm>
+        </p:spPr>
+        <p:txBody>
+          <a:bodyPr>
+            <a:normAutofit/>
+          </a:bodyPr>
+          <a:lstStyle/>
+          <a:p>
+            <a:pPr marL="0" indent="0">
+              <a:lnSpc>
+                <a:spcPct val="150000"/>
+              </a:lnSpc>
+              <a:buNone/>
+            </a:pPr>
+            <a:r>
+              <a:rPr lang="en-US" sz="2000"/>
+              <a:t>HATEOAS (Hypermedia as the Engine of Application State) is a constraint on REST</a:t>
+            </a:r>
+          </a:p>
+          <a:p>
+            <a:pPr marL="0" indent="0">
+              <a:lnSpc>
+                <a:spcPct val="150000"/>
+              </a:lnSpc>
+              <a:buNone/>
+            </a:pPr>
+            <a:r>
+              <a:rPr lang="en-US" sz="2000"/>
+              <a:t>A HATEOAS site dynamically provides information on how to navigate its’ REST-interfaces</a:t>
+            </a:r>
+          </a:p>
+          <a:p>
+            <a:pPr marL="0" indent="0">
+              <a:lnSpc>
+                <a:spcPct val="150000"/>
+              </a:lnSpc>
+              <a:buNone/>
+            </a:pPr>
+            <a:endParaRPr lang="en-US" sz="2000"/>
+          </a:p>
+          <a:p>
+            <a:pPr marL="0" indent="0">
+              <a:lnSpc>
+                <a:spcPct val="150000"/>
+              </a:lnSpc>
+              <a:buNone/>
+            </a:pPr>
+            <a:endParaRPr lang="en-US" sz="2000"/>
+          </a:p>
+          <a:p>
+            <a:pPr marL="0" indent="0">
+              <a:lnSpc>
+                <a:spcPct val="150000"/>
+              </a:lnSpc>
+              <a:buNone/>
+            </a:pPr>
+            <a:endParaRPr lang="en-US" sz="2000"/>
+          </a:p>
+          <a:p>
+            <a:pPr marL="0" indent="0">
+              <a:lnSpc>
+                <a:spcPct val="150000"/>
+              </a:lnSpc>
+              <a:buNone/>
+            </a:pPr>
+            <a:endParaRPr lang="en-US" sz="2000"/>
+          </a:p>
+          <a:p>
+            <a:pPr marL="0" indent="0">
+              <a:lnSpc>
+                <a:spcPct val="150000"/>
+              </a:lnSpc>
+              <a:buNone/>
+            </a:pPr>
+            <a:endParaRPr lang="en-US" sz="100"/>
+          </a:p>
+          <a:p>
+            <a:pPr marL="0" indent="0">
+              <a:lnSpc>
+                <a:spcPct val="150000"/>
+              </a:lnSpc>
+              <a:buNone/>
+            </a:pPr>
+            <a:r>
+              <a:rPr lang="en-US" sz="2000"/>
+              <a:t>The response contains follow-up links. Which links are included may vary, depending on the state of the resource. </a:t>
+            </a:r>
+          </a:p>
+          <a:p>
+            <a:pPr marL="0" indent="0">
+              <a:lnSpc>
+                <a:spcPct val="150000"/>
+              </a:lnSpc>
+              <a:buNone/>
+            </a:pPr>
+            <a:r>
+              <a:rPr lang="en-US" sz="2000"/>
+              <a:t>E.g. if an account is overdrawn, maybe the only possible action is to deposit money into it.</a:t>
+            </a:r>
+          </a:p>
+        </p:txBody>
+      </p:sp>
+      <p:sp>
+        <p:nvSpPr>
+          <p:cNvPr id="5" name="TextBox 4"/>
+          <p:cNvSpPr txBox="1"/>
+          <p:nvPr/>
+        </p:nvSpPr>
+        <p:spPr>
+          <a:xfrm>
+            <a:off x="1318161" y="2696806"/>
+            <a:ext cx="4465122" cy="1169551"/>
+          </a:xfrm>
+          <a:prstGeom prst="rect">
+            <a:avLst/>
+          </a:prstGeom>
+          <a:noFill/>
+        </p:spPr>
+        <p:txBody>
+          <a:bodyPr wrap="square" rtlCol="0">
+            <a:spAutoFit/>
+          </a:bodyPr>
+          <a:lstStyle/>
+          <a:p>
+            <a:r>
+              <a:rPr lang="en-US" sz="1400"/>
+              <a:t>Normal REST response:</a:t>
+            </a:r>
+          </a:p>
+          <a:p>
+            <a:r>
+              <a:rPr lang="en-US" sz="1400"/>
+              <a:t>{</a:t>
+            </a:r>
+          </a:p>
+          <a:p>
+            <a:r>
+              <a:rPr lang="en-US" sz="1400"/>
+              <a:t>“name”: “Alex”,</a:t>
+            </a:r>
+          </a:p>
+          <a:p>
+            <a:r>
+              <a:rPr lang="en-US" sz="1400"/>
+              <a:t>“account_no”: 12345</a:t>
+            </a:r>
+          </a:p>
+          <a:p>
+            <a:r>
+              <a:rPr lang="en-US" sz="1400"/>
+              <a:t>}</a:t>
+            </a:r>
+            <a:endParaRPr lang="fr-FR" sz="1400"/>
+          </a:p>
+        </p:txBody>
+      </p:sp>
+      <p:sp>
+        <p:nvSpPr>
+          <p:cNvPr id="6" name="TextBox 5"/>
+          <p:cNvSpPr txBox="1"/>
+          <p:nvPr/>
+        </p:nvSpPr>
+        <p:spPr>
+          <a:xfrm>
+            <a:off x="4904509" y="2696806"/>
+            <a:ext cx="6650182" cy="2462213"/>
+          </a:xfrm>
+          <a:prstGeom prst="rect">
+            <a:avLst/>
+          </a:prstGeom>
+          <a:noFill/>
+        </p:spPr>
+        <p:txBody>
+          <a:bodyPr wrap="square" rtlCol="0">
+            <a:spAutoFit/>
+          </a:bodyPr>
+          <a:lstStyle/>
+          <a:p>
+            <a:r>
+              <a:rPr lang="en-US" sz="1400"/>
+              <a:t>HATEOAS type-response:</a:t>
+            </a:r>
+          </a:p>
+          <a:p>
+            <a:r>
+              <a:rPr lang="en-US" sz="1400"/>
+              <a:t>{“content”: [ {</a:t>
+            </a:r>
+          </a:p>
+          <a:p>
+            <a:r>
+              <a:rPr lang="en-US" sz="1400"/>
+              <a:t>    “name”: “Alex”, </a:t>
+            </a:r>
+          </a:p>
+          <a:p>
+            <a:r>
+              <a:rPr lang="en-US" sz="1400"/>
+              <a:t>        "links": [ {</a:t>
+            </a:r>
+          </a:p>
+          <a:p>
+            <a:r>
+              <a:rPr lang="en-US" sz="1400"/>
+              <a:t>              "rel": "self",</a:t>
+            </a:r>
+          </a:p>
+          <a:p>
+            <a:r>
+              <a:rPr lang="en-US" sz="1400"/>
+              <a:t>              "href”:"http://foo.bar/customer/1"} ]},</a:t>
+            </a:r>
+          </a:p>
+          <a:p>
+            <a:r>
+              <a:rPr lang="en-US" sz="1400"/>
+              <a:t>    {</a:t>
+            </a:r>
+          </a:p>
+          <a:p>
+            <a:r>
+              <a:rPr lang="en-US" sz="1400"/>
+              <a:t>     “account_no”: 12345,</a:t>
+            </a:r>
+          </a:p>
+          <a:p>
+            <a:r>
+              <a:rPr lang="en-US" sz="1400"/>
+              <a:t>         "links": [ {</a:t>
+            </a:r>
+          </a:p>
+          <a:p>
+            <a:r>
+              <a:rPr lang="en-US" sz="1400"/>
+              <a:t>              "rel": ”deposit",</a:t>
+            </a:r>
+          </a:p>
+          <a:p>
+            <a:r>
+              <a:rPr lang="en-US" sz="1400"/>
+              <a:t>              "href”:"http://foo.bar/account/deposit/12345"}</a:t>
+            </a:r>
+            <a:r>
+              <a:rPr lang="en-US" sz="1400"/>
+              <a:t> }]}</a:t>
+            </a:r>
+            <a:endParaRPr lang="fr-FR" sz="1400"/>
+          </a:p>
+        </p:txBody>
+      </p:sp>
+    </p:spTree>
+    <p:extLst>
+      <p:ext uri="{BB962C8B-B14F-4D97-AF65-F5344CB8AC3E}">
+        <p14:creationId xmlns:p14="http://schemas.microsoft.com/office/powerpoint/2010/main" val="1161545017"/>
       </p:ext>
     </p:extLst>
   </p:cSld>

</xml_diff>

<commit_message>
I should probably just wait until I feel finished...
</commit_message>
<xml_diff>
--- a/Webapp_java.pptx
+++ b/Webapp_java.pptx
@@ -5,7 +5,7 @@
     <p:sldMasterId id="2147483648" r:id="rId1"/>
   </p:sldMasterIdLst>
   <p:notesMasterIdLst>
-    <p:notesMasterId r:id="rId33"/>
+    <p:notesMasterId r:id="rId34"/>
   </p:notesMasterIdLst>
   <p:sldIdLst>
     <p:sldId id="256" r:id="rId2"/>
@@ -39,6 +39,7 @@
     <p:sldId id="287" r:id="rId30"/>
     <p:sldId id="288" r:id="rId31"/>
     <p:sldId id="289" r:id="rId32"/>
+    <p:sldId id="290" r:id="rId33"/>
   </p:sldIdLst>
   <p:sldSz cx="12192000" cy="6858000"/>
   <p:notesSz cx="6858000" cy="9144000"/>
@@ -6763,7 +6764,7 @@
             </a:pPr>
             <a:r>
               <a:rPr lang="en-US" sz="2000"/>
-              <a:t>Get the source code: </a:t>
+              <a:t>Get the source code &amp; this presentation: </a:t>
             </a:r>
             <a:r>
               <a:rPr lang="en-US" sz="2000" u="sng">
@@ -7761,30 +7762,6 @@
             </a:pPr>
             <a:endParaRPr lang="en-US" sz="100"/>
           </a:p>
-          <a:p>
-            <a:pPr marL="0" indent="0">
-              <a:lnSpc>
-                <a:spcPct val="150000"/>
-              </a:lnSpc>
-              <a:buNone/>
-            </a:pPr>
-            <a:r>
-              <a:rPr lang="en-US" sz="2000"/>
-              <a:t>The response contains follow-up links. Which links are included may vary, depending on the state of the resource. </a:t>
-            </a:r>
-          </a:p>
-          <a:p>
-            <a:pPr marL="0" indent="0">
-              <a:lnSpc>
-                <a:spcPct val="150000"/>
-              </a:lnSpc>
-              <a:buNone/>
-            </a:pPr>
-            <a:r>
-              <a:rPr lang="en-US" sz="2000"/>
-              <a:t>E.g. if an account is overdrawn, maybe the only possible action is to deposit money into it.</a:t>
-            </a:r>
-          </a:p>
         </p:txBody>
       </p:sp>
       <p:sp>
@@ -7836,100 +7813,6 @@
             <a:r>
               <a:rPr lang="en-US" sz="1400"/>
               <a:t>}</a:t>
-            </a:r>
-            <a:endParaRPr lang="fr-FR" sz="1400"/>
-          </a:p>
-        </p:txBody>
-      </p:sp>
-      <p:sp>
-        <p:nvSpPr>
-          <p:cNvPr id="6" name="TextBox 5"/>
-          <p:cNvSpPr txBox="1"/>
-          <p:nvPr/>
-        </p:nvSpPr>
-        <p:spPr>
-          <a:xfrm>
-            <a:off x="4904509" y="2696806"/>
-            <a:ext cx="6650182" cy="2462213"/>
-          </a:xfrm>
-          <a:prstGeom prst="rect">
-            <a:avLst/>
-          </a:prstGeom>
-          <a:noFill/>
-        </p:spPr>
-        <p:txBody>
-          <a:bodyPr wrap="square" rtlCol="0">
-            <a:spAutoFit/>
-          </a:bodyPr>
-          <a:lstStyle/>
-          <a:p>
-            <a:r>
-              <a:rPr lang="en-US" sz="1400"/>
-              <a:t>HATEOAS type-response:</a:t>
-            </a:r>
-          </a:p>
-          <a:p>
-            <a:r>
-              <a:rPr lang="en-US" sz="1400"/>
-              <a:t>{“content”: [ {</a:t>
-            </a:r>
-          </a:p>
-          <a:p>
-            <a:r>
-              <a:rPr lang="en-US" sz="1400"/>
-              <a:t>    “name”: “Alex”, </a:t>
-            </a:r>
-          </a:p>
-          <a:p>
-            <a:r>
-              <a:rPr lang="en-US" sz="1400"/>
-              <a:t>        "links": [ {</a:t>
-            </a:r>
-          </a:p>
-          <a:p>
-            <a:r>
-              <a:rPr lang="en-US" sz="1400"/>
-              <a:t>              "rel": "self",</a:t>
-            </a:r>
-          </a:p>
-          <a:p>
-            <a:r>
-              <a:rPr lang="en-US" sz="1400"/>
-              <a:t>              "href”:"http://foo.bar/customer/1"} ]},</a:t>
-            </a:r>
-          </a:p>
-          <a:p>
-            <a:r>
-              <a:rPr lang="en-US" sz="1400"/>
-              <a:t>    {</a:t>
-            </a:r>
-          </a:p>
-          <a:p>
-            <a:r>
-              <a:rPr lang="en-US" sz="1400"/>
-              <a:t>     “account_no”: 12345,</a:t>
-            </a:r>
-          </a:p>
-          <a:p>
-            <a:r>
-              <a:rPr lang="en-US" sz="1400"/>
-              <a:t>         "links": [ {</a:t>
-            </a:r>
-          </a:p>
-          <a:p>
-            <a:r>
-              <a:rPr lang="en-US" sz="1400"/>
-              <a:t>              "rel": ”deposit",</a:t>
-            </a:r>
-          </a:p>
-          <a:p>
-            <a:r>
-              <a:rPr lang="en-US" sz="1400"/>
-              <a:t>              "href”:"http://foo.bar/account/deposit/12345"}</a:t>
-            </a:r>
-            <a:r>
-              <a:rPr lang="en-US" sz="1400"/>
-              <a:t> }]}</a:t>
             </a:r>
             <a:endParaRPr lang="fr-FR" sz="1400"/>
           </a:p>
@@ -8077,30 +7960,6 @@
             </a:pPr>
             <a:endParaRPr lang="en-US" sz="100"/>
           </a:p>
-          <a:p>
-            <a:pPr marL="0" indent="0">
-              <a:lnSpc>
-                <a:spcPct val="150000"/>
-              </a:lnSpc>
-              <a:buNone/>
-            </a:pPr>
-            <a:r>
-              <a:rPr lang="en-US" sz="2000"/>
-              <a:t>The response contains follow-up links. Which links are included may vary, depending on the state of the resource. </a:t>
-            </a:r>
-          </a:p>
-          <a:p>
-            <a:pPr marL="0" indent="0">
-              <a:lnSpc>
-                <a:spcPct val="150000"/>
-              </a:lnSpc>
-              <a:buNone/>
-            </a:pPr>
-            <a:r>
-              <a:rPr lang="en-US" sz="2000"/>
-              <a:t>E.g. if an account is overdrawn, maybe the only possible action is to deposit money into it.</a:t>
-            </a:r>
-          </a:p>
         </p:txBody>
       </p:sp>
       <p:sp>
@@ -8255,6 +8114,322 @@
     <p:extLst>
       <p:ext uri="{BB962C8B-B14F-4D97-AF65-F5344CB8AC3E}">
         <p14:creationId xmlns:p14="http://schemas.microsoft.com/office/powerpoint/2010/main" val="1161545017"/>
+      </p:ext>
+    </p:extLst>
+  </p:cSld>
+  <p:clrMapOvr>
+    <a:masterClrMapping/>
+  </p:clrMapOvr>
+</p:sld>
+</file>
+
+<file path=ppt/slides/slide32.xml><?xml version="1.0" encoding="utf-8"?>
+<p:sld xmlns:a="http://schemas.openxmlformats.org/drawingml/2006/main" xmlns:r="http://schemas.openxmlformats.org/officeDocument/2006/relationships" xmlns:p="http://schemas.openxmlformats.org/presentationml/2006/main">
+  <p:cSld>
+    <p:spTree>
+      <p:nvGrpSpPr>
+        <p:cNvPr id="1" name=""/>
+        <p:cNvGrpSpPr/>
+        <p:nvPr/>
+      </p:nvGrpSpPr>
+      <p:grpSpPr>
+        <a:xfrm>
+          <a:off x="0" y="0"/>
+          <a:ext cx="0" cy="0"/>
+          <a:chOff x="0" y="0"/>
+          <a:chExt cx="0" cy="0"/>
+        </a:xfrm>
+      </p:grpSpPr>
+      <p:sp>
+        <p:nvSpPr>
+          <p:cNvPr id="2" name="Title 1"/>
+          <p:cNvSpPr>
+            <a:spLocks noGrp="1"/>
+          </p:cNvSpPr>
+          <p:nvPr>
+            <p:ph type="title"/>
+          </p:nvPr>
+        </p:nvSpPr>
+        <p:spPr/>
+        <p:txBody>
+          <a:bodyPr/>
+          <a:lstStyle/>
+          <a:p>
+            <a:r>
+              <a:rPr lang="en-US"/>
+              <a:t>HATEOAS</a:t>
+            </a:r>
+          </a:p>
+        </p:txBody>
+      </p:sp>
+      <p:sp>
+        <p:nvSpPr>
+          <p:cNvPr id="3" name="Content Placeholder 2"/>
+          <p:cNvSpPr>
+            <a:spLocks noGrp="1"/>
+          </p:cNvSpPr>
+          <p:nvPr>
+            <p:ph sz="half" idx="1"/>
+          </p:nvPr>
+        </p:nvSpPr>
+        <p:spPr>
+          <a:xfrm>
+            <a:off x="838200" y="1504256"/>
+            <a:ext cx="10515600" cy="5353743"/>
+          </a:xfrm>
+        </p:spPr>
+        <p:txBody>
+          <a:bodyPr>
+            <a:normAutofit/>
+          </a:bodyPr>
+          <a:lstStyle/>
+          <a:p>
+            <a:pPr marL="0" indent="0">
+              <a:lnSpc>
+                <a:spcPct val="150000"/>
+              </a:lnSpc>
+              <a:buNone/>
+            </a:pPr>
+            <a:r>
+              <a:rPr lang="en-US" sz="2000"/>
+              <a:t>HATEOAS (Hypermedia as the Engine of Application State) is a constraint on REST</a:t>
+            </a:r>
+          </a:p>
+          <a:p>
+            <a:pPr marL="0" indent="0">
+              <a:lnSpc>
+                <a:spcPct val="150000"/>
+              </a:lnSpc>
+              <a:buNone/>
+            </a:pPr>
+            <a:r>
+              <a:rPr lang="en-US" sz="2000"/>
+              <a:t>A HATEOAS site dynamically provides information on how to navigate its’ REST-interfaces</a:t>
+            </a:r>
+          </a:p>
+          <a:p>
+            <a:pPr marL="0" indent="0">
+              <a:lnSpc>
+                <a:spcPct val="150000"/>
+              </a:lnSpc>
+              <a:buNone/>
+            </a:pPr>
+            <a:endParaRPr lang="en-US" sz="2000"/>
+          </a:p>
+          <a:p>
+            <a:pPr marL="0" indent="0">
+              <a:lnSpc>
+                <a:spcPct val="150000"/>
+              </a:lnSpc>
+              <a:buNone/>
+            </a:pPr>
+            <a:endParaRPr lang="en-US" sz="2000"/>
+          </a:p>
+          <a:p>
+            <a:pPr marL="0" indent="0">
+              <a:lnSpc>
+                <a:spcPct val="150000"/>
+              </a:lnSpc>
+              <a:buNone/>
+            </a:pPr>
+            <a:endParaRPr lang="en-US" sz="2000"/>
+          </a:p>
+          <a:p>
+            <a:pPr marL="0" indent="0">
+              <a:lnSpc>
+                <a:spcPct val="150000"/>
+              </a:lnSpc>
+              <a:buNone/>
+            </a:pPr>
+            <a:endParaRPr lang="en-US" sz="2000"/>
+          </a:p>
+          <a:p>
+            <a:pPr marL="0" indent="0">
+              <a:lnSpc>
+                <a:spcPct val="150000"/>
+              </a:lnSpc>
+              <a:buNone/>
+            </a:pPr>
+            <a:endParaRPr lang="en-US" sz="100"/>
+          </a:p>
+          <a:p>
+            <a:pPr marL="0" indent="0">
+              <a:lnSpc>
+                <a:spcPct val="150000"/>
+              </a:lnSpc>
+              <a:buNone/>
+            </a:pPr>
+            <a:r>
+              <a:rPr lang="en-US" sz="2000"/>
+              <a:t>The response contains follow-up links. Which links are included may vary, depending on the state of the resource. </a:t>
+            </a:r>
+          </a:p>
+          <a:p>
+            <a:pPr marL="0" indent="0">
+              <a:lnSpc>
+                <a:spcPct val="150000"/>
+              </a:lnSpc>
+              <a:buNone/>
+            </a:pPr>
+            <a:r>
+              <a:rPr lang="en-US" sz="2000"/>
+              <a:t>E.g. if an account is overdrawn, maybe the only possible action is to deposit money into it.</a:t>
+            </a:r>
+          </a:p>
+        </p:txBody>
+      </p:sp>
+      <p:sp>
+        <p:nvSpPr>
+          <p:cNvPr id="5" name="TextBox 4"/>
+          <p:cNvSpPr txBox="1"/>
+          <p:nvPr/>
+        </p:nvSpPr>
+        <p:spPr>
+          <a:xfrm>
+            <a:off x="1318161" y="2696806"/>
+            <a:ext cx="4465122" cy="1169551"/>
+          </a:xfrm>
+          <a:prstGeom prst="rect">
+            <a:avLst/>
+          </a:prstGeom>
+          <a:noFill/>
+        </p:spPr>
+        <p:txBody>
+          <a:bodyPr wrap="square" rtlCol="0">
+            <a:spAutoFit/>
+          </a:bodyPr>
+          <a:lstStyle/>
+          <a:p>
+            <a:r>
+              <a:rPr lang="en-US" sz="1400"/>
+              <a:t>Normal REST response:</a:t>
+            </a:r>
+          </a:p>
+          <a:p>
+            <a:r>
+              <a:rPr lang="en-US" sz="1400"/>
+              <a:t>{</a:t>
+            </a:r>
+          </a:p>
+          <a:p>
+            <a:r>
+              <a:rPr lang="en-US" sz="1400"/>
+              <a:t>“name”: “Alex”,</a:t>
+            </a:r>
+          </a:p>
+          <a:p>
+            <a:r>
+              <a:rPr lang="en-US" sz="1400"/>
+              <a:t>“account_no”: 12345</a:t>
+            </a:r>
+          </a:p>
+          <a:p>
+            <a:r>
+              <a:rPr lang="en-US" sz="1400"/>
+              <a:t>}</a:t>
+            </a:r>
+            <a:endParaRPr lang="fr-FR" sz="1400"/>
+          </a:p>
+        </p:txBody>
+      </p:sp>
+      <p:sp>
+        <p:nvSpPr>
+          <p:cNvPr id="6" name="TextBox 5"/>
+          <p:cNvSpPr txBox="1"/>
+          <p:nvPr/>
+        </p:nvSpPr>
+        <p:spPr>
+          <a:xfrm>
+            <a:off x="4904509" y="2696806"/>
+            <a:ext cx="6650182" cy="2462213"/>
+          </a:xfrm>
+          <a:prstGeom prst="rect">
+            <a:avLst/>
+          </a:prstGeom>
+          <a:noFill/>
+        </p:spPr>
+        <p:txBody>
+          <a:bodyPr wrap="square" rtlCol="0">
+            <a:spAutoFit/>
+          </a:bodyPr>
+          <a:lstStyle/>
+          <a:p>
+            <a:r>
+              <a:rPr lang="en-US" sz="1400"/>
+              <a:t>HATEOAS type-response:</a:t>
+            </a:r>
+          </a:p>
+          <a:p>
+            <a:r>
+              <a:rPr lang="en-US" sz="1400"/>
+              <a:t>{“content”: [ {</a:t>
+            </a:r>
+          </a:p>
+          <a:p>
+            <a:r>
+              <a:rPr lang="en-US" sz="1400"/>
+              <a:t>    “name”: “Alex”, </a:t>
+            </a:r>
+          </a:p>
+          <a:p>
+            <a:r>
+              <a:rPr lang="en-US" sz="1400"/>
+              <a:t>        "links": [ {</a:t>
+            </a:r>
+          </a:p>
+          <a:p>
+            <a:r>
+              <a:rPr lang="en-US" sz="1400"/>
+              <a:t>              "rel": "self",</a:t>
+            </a:r>
+          </a:p>
+          <a:p>
+            <a:r>
+              <a:rPr lang="en-US" sz="1400"/>
+              <a:t>              "href”:"http://foo.bar/customer/1"} ]},</a:t>
+            </a:r>
+          </a:p>
+          <a:p>
+            <a:r>
+              <a:rPr lang="en-US" sz="1400"/>
+              <a:t>    {</a:t>
+            </a:r>
+          </a:p>
+          <a:p>
+            <a:r>
+              <a:rPr lang="en-US" sz="1400"/>
+              <a:t>     “account_no”: 12345,</a:t>
+            </a:r>
+          </a:p>
+          <a:p>
+            <a:r>
+              <a:rPr lang="en-US" sz="1400"/>
+              <a:t>         "links": [ {</a:t>
+            </a:r>
+          </a:p>
+          <a:p>
+            <a:r>
+              <a:rPr lang="en-US" sz="1400"/>
+              <a:t>              "rel": ”deposit",</a:t>
+            </a:r>
+          </a:p>
+          <a:p>
+            <a:r>
+              <a:rPr lang="en-US" sz="1400"/>
+              <a:t>              "href”:"http://foo.bar/account/deposit/12345"}</a:t>
+            </a:r>
+            <a:r>
+              <a:rPr lang="en-US" sz="1400"/>
+              <a:t> }]}</a:t>
+            </a:r>
+            <a:endParaRPr lang="fr-FR" sz="1400"/>
+          </a:p>
+        </p:txBody>
+      </p:sp>
+    </p:spTree>
+    <p:extLst>
+      <p:ext uri="{BB962C8B-B14F-4D97-AF65-F5344CB8AC3E}">
+        <p14:creationId xmlns:p14="http://schemas.microsoft.com/office/powerpoint/2010/main" val="184788191"/>
       </p:ext>
     </p:extLst>
   </p:cSld>

</xml_diff>

<commit_message>
Minor changes, e.g. changed confusing local variable name in Dao
</commit_message>
<xml_diff>
--- a/Webapp_java.pptx
+++ b/Webapp_java.pptx
@@ -227,7 +227,7 @@
           </a:lstStyle>
           <a:p>
             <a:fld id="{57D91F3D-943A-D943-953A-95CE0700992C}" type="datetimeFigureOut">
-              <a:t>4/3/16</a:t>
+              <a:t>4/5/16</a:t>
             </a:fld>
             <a:endParaRPr lang="en-US"/>
           </a:p>
@@ -707,7 +707,7 @@
           <a:lstStyle/>
           <a:p>
             <a:fld id="{547968EC-E478-D740-9239-18B19A4D32F9}" type="datetimeFigureOut">
-              <a:t>4/2/16</a:t>
+              <a:t>4/5/16</a:t>
             </a:fld>
             <a:endParaRPr lang="en-US"/>
           </a:p>
@@ -875,7 +875,7 @@
           <a:lstStyle/>
           <a:p>
             <a:fld id="{547968EC-E478-D740-9239-18B19A4D32F9}" type="datetimeFigureOut">
-              <a:t>4/2/16</a:t>
+              <a:t>4/5/16</a:t>
             </a:fld>
             <a:endParaRPr lang="en-US"/>
           </a:p>
@@ -1053,7 +1053,7 @@
           <a:lstStyle/>
           <a:p>
             <a:fld id="{547968EC-E478-D740-9239-18B19A4D32F9}" type="datetimeFigureOut">
-              <a:t>4/2/16</a:t>
+              <a:t>4/5/16</a:t>
             </a:fld>
             <a:endParaRPr lang="en-US"/>
           </a:p>
@@ -1221,7 +1221,7 @@
           <a:lstStyle/>
           <a:p>
             <a:fld id="{547968EC-E478-D740-9239-18B19A4D32F9}" type="datetimeFigureOut">
-              <a:t>4/2/16</a:t>
+              <a:t>4/5/16</a:t>
             </a:fld>
             <a:endParaRPr lang="en-US"/>
           </a:p>
@@ -1465,7 +1465,7 @@
           <a:lstStyle/>
           <a:p>
             <a:fld id="{547968EC-E478-D740-9239-18B19A4D32F9}" type="datetimeFigureOut">
-              <a:t>4/2/16</a:t>
+              <a:t>4/5/16</a:t>
             </a:fld>
             <a:endParaRPr lang="en-US"/>
           </a:p>
@@ -1695,7 +1695,7 @@
           <a:lstStyle/>
           <a:p>
             <a:fld id="{547968EC-E478-D740-9239-18B19A4D32F9}" type="datetimeFigureOut">
-              <a:t>4/2/16</a:t>
+              <a:t>4/5/16</a:t>
             </a:fld>
             <a:endParaRPr lang="en-US"/>
           </a:p>
@@ -2060,7 +2060,7 @@
           <a:lstStyle/>
           <a:p>
             <a:fld id="{547968EC-E478-D740-9239-18B19A4D32F9}" type="datetimeFigureOut">
-              <a:t>4/2/16</a:t>
+              <a:t>4/5/16</a:t>
             </a:fld>
             <a:endParaRPr lang="en-US"/>
           </a:p>
@@ -2176,7 +2176,7 @@
           <a:lstStyle/>
           <a:p>
             <a:fld id="{547968EC-E478-D740-9239-18B19A4D32F9}" type="datetimeFigureOut">
-              <a:t>4/2/16</a:t>
+              <a:t>4/5/16</a:t>
             </a:fld>
             <a:endParaRPr lang="en-US"/>
           </a:p>
@@ -2269,7 +2269,7 @@
           <a:lstStyle/>
           <a:p>
             <a:fld id="{547968EC-E478-D740-9239-18B19A4D32F9}" type="datetimeFigureOut">
-              <a:t>4/2/16</a:t>
+              <a:t>4/5/16</a:t>
             </a:fld>
             <a:endParaRPr lang="en-US"/>
           </a:p>
@@ -2544,7 +2544,7 @@
           <a:lstStyle/>
           <a:p>
             <a:fld id="{547968EC-E478-D740-9239-18B19A4D32F9}" type="datetimeFigureOut">
-              <a:t>4/2/16</a:t>
+              <a:t>4/5/16</a:t>
             </a:fld>
             <a:endParaRPr lang="en-US"/>
           </a:p>
@@ -2795,7 +2795,7 @@
           <a:lstStyle/>
           <a:p>
             <a:fld id="{547968EC-E478-D740-9239-18B19A4D32F9}" type="datetimeFigureOut">
-              <a:t>4/2/16</a:t>
+              <a:t>4/5/16</a:t>
             </a:fld>
             <a:endParaRPr lang="en-US"/>
           </a:p>
@@ -3006,7 +3006,7 @@
           </a:lstStyle>
           <a:p>
             <a:fld id="{547968EC-E478-D740-9239-18B19A4D32F9}" type="datetimeFigureOut">
-              <a:t>4/2/16</a:t>
+              <a:t>4/5/16</a:t>
             </a:fld>
             <a:endParaRPr lang="en-US"/>
           </a:p>
@@ -6737,7 +6737,6 @@
               <a:rPr lang="en-US"/>
               <a:t>Getting started</a:t>
             </a:r>
-            <a:endParaRPr lang="en-US"/>
           </a:p>
         </p:txBody>
       </p:sp>
@@ -6751,7 +6750,12 @@
             <p:ph idx="1"/>
           </p:nvPr>
         </p:nvSpPr>
-        <p:spPr/>
+        <p:spPr>
+          <a:xfrm>
+            <a:off x="838200" y="1690688"/>
+            <a:ext cx="10515600" cy="4351338"/>
+          </a:xfrm>
+        </p:spPr>
         <p:txBody>
           <a:bodyPr/>
           <a:lstStyle/>
@@ -7017,7 +7021,7 @@
         </p:nvSpPr>
         <p:spPr>
           <a:xfrm>
-            <a:off x="695696" y="1080655"/>
+            <a:off x="695696" y="967921"/>
             <a:ext cx="5181600" cy="6070085"/>
           </a:xfrm>
         </p:spPr>
@@ -7159,7 +7163,7 @@
         </p:nvSpPr>
         <p:spPr>
           <a:xfrm>
-            <a:off x="6172200" y="1080655"/>
+            <a:off x="6172200" y="967921"/>
             <a:ext cx="5181600" cy="6604165"/>
           </a:xfrm>
         </p:spPr>
@@ -7253,7 +7257,6 @@
               <a:rPr lang="en-US" sz="1400"/>
               <a:t>Use Requestmethod.GET while developing to test API-calls directly in the browser</a:t>
             </a:r>
-            <a:endParaRPr lang="en-US" sz="1400"/>
           </a:p>
           <a:p>
             <a:pPr marL="0" indent="0">
@@ -7264,7 +7267,7 @@
             </a:pPr>
             <a:r>
               <a:rPr lang="en-US" sz="1400"/>
-              <a:t>Source with solutions: </a:t>
+              <a:t>Source with all tasks implemented: </a:t>
             </a:r>
             <a:r>
               <a:rPr lang="en-US" sz="1400" u="sng"/>
@@ -7283,7 +7286,7 @@
         <p:spPr>
           <a:xfrm>
             <a:off x="695696" y="331804"/>
-            <a:ext cx="2529444" cy="523220"/>
+            <a:ext cx="2529444" cy="461665"/>
           </a:xfrm>
           <a:prstGeom prst="rect">
             <a:avLst/>
@@ -7297,7 +7300,7 @@
           <a:lstStyle/>
           <a:p>
             <a:r>
-              <a:rPr lang="en-US" sz="2800"/>
+              <a:rPr lang="en-US" sz="2400"/>
               <a:t>Tasks</a:t>
             </a:r>
             <a:endParaRPr lang="en-US"/>
@@ -8125,11 +8128,7 @@
           <a:p>
             <a:r>
               <a:rPr lang="en-US" sz="1400"/>
-              <a:t>              "href”:"http://foo.bar/account/deposit/12345"}</a:t>
-            </a:r>
-            <a:r>
-              <a:rPr lang="en-US" sz="1400"/>
-              <a:t> }]}</a:t>
+              <a:t>              "href”:"http://foo.bar/account/deposit/12345"} }]}</a:t>
             </a:r>
             <a:endParaRPr lang="fr-FR" sz="1400"/>
           </a:p>
@@ -8441,11 +8440,7 @@
           <a:p>
             <a:r>
               <a:rPr lang="en-US" sz="1400"/>
-              <a:t>              "href”:"http://foo.bar/account/deposit/12345"}</a:t>
-            </a:r>
-            <a:r>
-              <a:rPr lang="en-US" sz="1400"/>
-              <a:t> }]}</a:t>
+              <a:t>              "href”:"http://foo.bar/account/deposit/12345"} }]}</a:t>
             </a:r>
             <a:endParaRPr lang="fr-FR" sz="1400"/>
           </a:p>

</xml_diff>